<commit_message>
Changes to the customer presentation.
</commit_message>
<xml_diff>
--- a/presentation/TDT4290_Customer_Presentasjon.pptx
+++ b/presentation/TDT4290_Customer_Presentasjon.pptx
@@ -8,14 +8,13 @@
     <p:sldId id="256" r:id="rId2"/>
     <p:sldId id="280" r:id="rId3"/>
     <p:sldId id="278" r:id="rId4"/>
-    <p:sldId id="258" r:id="rId5"/>
-    <p:sldId id="293" r:id="rId6"/>
+    <p:sldId id="293" r:id="rId5"/>
+    <p:sldId id="260" r:id="rId6"/>
     <p:sldId id="259" r:id="rId7"/>
-    <p:sldId id="260" r:id="rId8"/>
-    <p:sldId id="261" r:id="rId9"/>
-    <p:sldId id="271" r:id="rId10"/>
-    <p:sldId id="268" r:id="rId11"/>
-    <p:sldId id="263" r:id="rId12"/>
+    <p:sldId id="261" r:id="rId8"/>
+    <p:sldId id="271" r:id="rId9"/>
+    <p:sldId id="268" r:id="rId10"/>
+    <p:sldId id="263" r:id="rId11"/>
   </p:sldIdLst>
   <p:sldSz cx="9144000" cy="6858000" type="screen4x3"/>
   <p:notesSz cx="6858000" cy="9144000"/>
@@ -400,7 +399,7 @@
           <a:p>
             <a:fld id="{651A0C47-018D-4460-B945-BFF7981B6CA6}" type="datetimeFigureOut">
               <a:rPr lang="en-US" smtClean="0"/>
-              <a:t>11/15/2011</a:t>
+              <a:t>16.11.11</a:t>
             </a:fld>
             <a:endParaRPr lang="en-US"/>
           </a:p>
@@ -592,7 +591,7 @@
           <a:p>
             <a:fld id="{EFF1E1C4-020C-3C49-82E1-601ABE71F045}" type="datetimeFigureOut">
               <a:rPr lang="nb-NO" smtClean="0"/>
-              <a:t>15.11.2011</a:t>
+              <a:t>16.11.11</a:t>
             </a:fld>
             <a:endParaRPr lang="nb-NO"/>
           </a:p>
@@ -861,7 +860,7 @@
           <a:p>
             <a:fld id="{EFF1E1C4-020C-3C49-82E1-601ABE71F045}" type="datetimeFigureOut">
               <a:rPr lang="nb-NO" smtClean="0"/>
-              <a:t>15.11.2011</a:t>
+              <a:t>16.11.11</a:t>
             </a:fld>
             <a:endParaRPr lang="nb-NO"/>
           </a:p>
@@ -1040,7 +1039,7 @@
           <a:p>
             <a:fld id="{EFF1E1C4-020C-3C49-82E1-601ABE71F045}" type="datetimeFigureOut">
               <a:rPr lang="nb-NO" smtClean="0"/>
-              <a:t>15.11.2011</a:t>
+              <a:t>16.11.11</a:t>
             </a:fld>
             <a:endParaRPr lang="nb-NO"/>
           </a:p>
@@ -1209,7 +1208,7 @@
           <a:p>
             <a:fld id="{EFF1E1C4-020C-3C49-82E1-601ABE71F045}" type="datetimeFigureOut">
               <a:rPr lang="nb-NO" smtClean="0"/>
-              <a:t>15.11.2011</a:t>
+              <a:t>16.11.11</a:t>
             </a:fld>
             <a:endParaRPr lang="nb-NO"/>
           </a:p>
@@ -1451,7 +1450,7 @@
           <a:p>
             <a:fld id="{EFF1E1C4-020C-3C49-82E1-601ABE71F045}" type="datetimeFigureOut">
               <a:rPr lang="nb-NO" smtClean="0"/>
-              <a:t>15.11.2011</a:t>
+              <a:t>16.11.11</a:t>
             </a:fld>
             <a:endParaRPr lang="nb-NO"/>
           </a:p>
@@ -1774,7 +1773,7 @@
           <a:p>
             <a:fld id="{651A0C47-018D-4460-B945-BFF7981B6CA6}" type="datetimeFigureOut">
               <a:rPr lang="en-US" smtClean="0"/>
-              <a:t>11/15/2011</a:t>
+              <a:t>16.11.11</a:t>
             </a:fld>
             <a:endParaRPr lang="en-US"/>
           </a:p>
@@ -2072,7 +2071,7 @@
           <a:p>
             <a:fld id="{EFF1E1C4-020C-3C49-82E1-601ABE71F045}" type="datetimeFigureOut">
               <a:rPr lang="nb-NO" smtClean="0"/>
-              <a:t>15.11.2011</a:t>
+              <a:t>16.11.11</a:t>
             </a:fld>
             <a:endParaRPr lang="nb-NO"/>
           </a:p>
@@ -2528,7 +2527,7 @@
           <a:p>
             <a:fld id="{EFF1E1C4-020C-3C49-82E1-601ABE71F045}" type="datetimeFigureOut">
               <a:rPr lang="nb-NO" smtClean="0"/>
-              <a:t>15.11.2011</a:t>
+              <a:t>16.11.11</a:t>
             </a:fld>
             <a:endParaRPr lang="nb-NO"/>
           </a:p>
@@ -2641,7 +2640,7 @@
           <a:p>
             <a:fld id="{EFF1E1C4-020C-3C49-82E1-601ABE71F045}" type="datetimeFigureOut">
               <a:rPr lang="nb-NO" smtClean="0"/>
-              <a:t>15.11.2011</a:t>
+              <a:t>16.11.11</a:t>
             </a:fld>
             <a:endParaRPr lang="nb-NO"/>
           </a:p>
@@ -2731,7 +2730,7 @@
           <a:p>
             <a:fld id="{EFF1E1C4-020C-3C49-82E1-601ABE71F045}" type="datetimeFigureOut">
               <a:rPr lang="nb-NO" smtClean="0"/>
-              <a:t>15.11.2011</a:t>
+              <a:t>16.11.11</a:t>
             </a:fld>
             <a:endParaRPr lang="nb-NO"/>
           </a:p>
@@ -3013,7 +3012,7 @@
           <a:p>
             <a:fld id="{EFF1E1C4-020C-3C49-82E1-601ABE71F045}" type="datetimeFigureOut">
               <a:rPr lang="nb-NO" smtClean="0"/>
-              <a:t>15.11.2011</a:t>
+              <a:t>16.11.11</a:t>
             </a:fld>
             <a:endParaRPr lang="nb-NO"/>
           </a:p>
@@ -3219,7 +3218,7 @@
           <a:p>
             <a:fld id="{EFF1E1C4-020C-3C49-82E1-601ABE71F045}" type="datetimeFigureOut">
               <a:rPr lang="nb-NO" smtClean="0"/>
-              <a:t>15.11.2011</a:t>
+              <a:t>16.11.11</a:t>
             </a:fld>
             <a:endParaRPr lang="nb-NO"/>
           </a:p>
@@ -3753,13 +3752,13 @@
   <p:clrMapOvr>
     <a:masterClrMapping/>
   </p:clrMapOvr>
-  <p:transition spd="slow">
+  <p:transition xmlns:p14="http://schemas.microsoft.com/office/powerpoint/2010/main" spd="slow">
     <p:push dir="u"/>
   </p:transition>
   <p:timing>
     <p:tnLst>
       <p:par>
-        <p:cTn id="1" dur="indefinite" restart="never" nodeType="tmRoot"/>
+        <p:cTn xmlns:p14="http://schemas.microsoft.com/office/powerpoint/2010/main" id="1" dur="indefinite" restart="never" nodeType="tmRoot"/>
       </p:par>
     </p:tnLst>
   </p:timing>
@@ -3800,133 +3799,6 @@
           <a:p>
             <a:r>
               <a:rPr lang="en-GB" dirty="0" smtClean="0"/>
-              <a:t>CSjark</a:t>
-            </a:r>
-            <a:endParaRPr lang="en-GB" dirty="0"/>
-          </a:p>
-        </p:txBody>
-      </p:sp>
-      <p:sp>
-        <p:nvSpPr>
-          <p:cNvPr id="3" name="Plassholder for innhold 2"/>
-          <p:cNvSpPr>
-            <a:spLocks noGrp="1"/>
-          </p:cNvSpPr>
-          <p:nvPr>
-            <p:ph idx="1"/>
-          </p:nvPr>
-        </p:nvSpPr>
-        <p:spPr/>
-        <p:txBody>
-          <a:bodyPr/>
-          <a:lstStyle/>
-          <a:p>
-            <a:r>
-              <a:rPr lang="en-GB" dirty="0" smtClean="0"/>
-              <a:t>A command line </a:t>
-            </a:r>
-            <a:r>
-              <a:rPr lang="en-GB" dirty="0" smtClean="0"/>
-              <a:t>tool written in python</a:t>
-            </a:r>
-            <a:endParaRPr lang="en-GB" dirty="0" smtClean="0"/>
-          </a:p>
-          <a:p>
-            <a:r>
-              <a:rPr lang="en-GB" dirty="0" smtClean="0"/>
-              <a:t>Takes header files, configuration files and some C macroes as </a:t>
-            </a:r>
-            <a:r>
-              <a:rPr lang="en-GB" dirty="0" smtClean="0"/>
-              <a:t>input</a:t>
-            </a:r>
-            <a:endParaRPr lang="en-GB" dirty="0" smtClean="0"/>
-          </a:p>
-          <a:p>
-            <a:r>
-              <a:rPr lang="en-GB" dirty="0" smtClean="0"/>
-              <a:t>Gives lua dissectors as </a:t>
-            </a:r>
-            <a:r>
-              <a:rPr lang="en-GB" dirty="0" smtClean="0"/>
-              <a:t>output</a:t>
-            </a:r>
-            <a:endParaRPr lang="en-GB" dirty="0" smtClean="0"/>
-          </a:p>
-          <a:p>
-            <a:r>
-              <a:rPr lang="en-GB" dirty="0" smtClean="0"/>
-              <a:t>Outputs </a:t>
-            </a:r>
-            <a:r>
-              <a:rPr lang="en-GB" dirty="0" smtClean="0"/>
-              <a:t>semantics are very </a:t>
-            </a:r>
-            <a:r>
-              <a:rPr lang="en-GB" dirty="0" smtClean="0"/>
-              <a:t>configurable</a:t>
-            </a:r>
-            <a:endParaRPr lang="en-GB" dirty="0" smtClean="0"/>
-          </a:p>
-        </p:txBody>
-      </p:sp>
-    </p:spTree>
-    <p:extLst>
-      <p:ext uri="{BB962C8B-B14F-4D97-AF65-F5344CB8AC3E}">
-        <p14:creationId xmlns:p14="http://schemas.microsoft.com/office/powerpoint/2010/main" val="1075118078"/>
-      </p:ext>
-    </p:extLst>
-  </p:cSld>
-  <p:clrMapOvr>
-    <a:masterClrMapping/>
-  </p:clrMapOvr>
-  <p:transition spd="slow">
-    <p:push dir="u"/>
-  </p:transition>
-  <p:timing>
-    <p:tnLst>
-      <p:par>
-        <p:cTn id="1" dur="indefinite" restart="never" nodeType="tmRoot"/>
-      </p:par>
-    </p:tnLst>
-  </p:timing>
-</p:sld>
-</file>
-
-<file path=ppt/slides/slide11.xml><?xml version="1.0" encoding="utf-8"?>
-<p:sld xmlns:a="http://schemas.openxmlformats.org/drawingml/2006/main" xmlns:r="http://schemas.openxmlformats.org/officeDocument/2006/relationships" xmlns:p="http://schemas.openxmlformats.org/presentationml/2006/main">
-  <p:cSld>
-    <p:spTree>
-      <p:nvGrpSpPr>
-        <p:cNvPr id="1" name=""/>
-        <p:cNvGrpSpPr/>
-        <p:nvPr/>
-      </p:nvGrpSpPr>
-      <p:grpSpPr>
-        <a:xfrm>
-          <a:off x="0" y="0"/>
-          <a:ext cx="0" cy="0"/>
-          <a:chOff x="0" y="0"/>
-          <a:chExt cx="0" cy="0"/>
-        </a:xfrm>
-      </p:grpSpPr>
-      <p:sp>
-        <p:nvSpPr>
-          <p:cNvPr id="2" name="Tittel 1"/>
-          <p:cNvSpPr>
-            <a:spLocks noGrp="1"/>
-          </p:cNvSpPr>
-          <p:nvPr>
-            <p:ph type="title"/>
-          </p:nvPr>
-        </p:nvSpPr>
-        <p:spPr/>
-        <p:txBody>
-          <a:bodyPr/>
-          <a:lstStyle/>
-          <a:p>
-            <a:r>
-              <a:rPr lang="en-GB" dirty="0" smtClean="0"/>
               <a:t>Demo</a:t>
             </a:r>
             <a:endParaRPr lang="en-GB" dirty="0"/>
@@ -3964,13 +3836,13 @@
   <p:clrMapOvr>
     <a:masterClrMapping/>
   </p:clrMapOvr>
-  <p:transition spd="slow">
+  <p:transition xmlns:p14="http://schemas.microsoft.com/office/powerpoint/2010/main" spd="slow">
     <p:push dir="u"/>
   </p:transition>
   <p:timing>
     <p:tnLst>
       <p:par>
-        <p:cTn id="1" dur="indefinite" restart="never" nodeType="tmRoot"/>
+        <p:cTn xmlns:p14="http://schemas.microsoft.com/office/powerpoint/2010/main" id="1" dur="indefinite" restart="never" nodeType="tmRoot"/>
       </p:par>
     </p:tnLst>
   </p:timing>
@@ -4010,8 +3882,8 @@
           <a:lstStyle/>
           <a:p>
             <a:r>
-              <a:rPr lang="nb-NO" dirty="0" err="1" smtClean="0"/>
-              <a:t>Outline</a:t>
+              <a:rPr lang="nb-NO" dirty="0" smtClean="0"/>
+              <a:t>Agenda</a:t>
             </a:r>
             <a:endParaRPr lang="en-GB" dirty="0"/>
           </a:p>
@@ -4034,11 +3906,7 @@
           <a:p>
             <a:r>
               <a:rPr lang="nb-NO" dirty="0" smtClean="0"/>
-              <a:t>The </a:t>
-            </a:r>
-            <a:r>
-              <a:rPr lang="nb-NO" dirty="0" smtClean="0"/>
-              <a:t>team</a:t>
+              <a:t>The team</a:t>
             </a:r>
           </a:p>
           <a:p>
@@ -4114,6 +3982,16 @@
   <p:clrMapOvr>
     <a:masterClrMapping/>
   </p:clrMapOvr>
+  <p:transition xmlns:p14="http://schemas.microsoft.com/office/powerpoint/2010/main" spd="slow">
+    <p:push dir="u"/>
+  </p:transition>
+  <p:timing>
+    <p:tnLst>
+      <p:par>
+        <p:cTn xmlns:p14="http://schemas.microsoft.com/office/powerpoint/2010/main" id="1" dur="indefinite" restart="never" nodeType="tmRoot"/>
+      </p:par>
+    </p:tnLst>
+  </p:timing>
 </p:sld>
 </file>
 
@@ -4196,6 +4074,16 @@
   <p:clrMapOvr>
     <a:masterClrMapping/>
   </p:clrMapOvr>
+  <p:transition xmlns:p14="http://schemas.microsoft.com/office/powerpoint/2010/main" spd="slow">
+    <p:push dir="u"/>
+  </p:transition>
+  <p:timing>
+    <p:tnLst>
+      <p:par>
+        <p:cTn xmlns:p14="http://schemas.microsoft.com/office/powerpoint/2010/main" id="1" dur="indefinite" restart="never" nodeType="tmRoot"/>
+      </p:par>
+    </p:tnLst>
+  </p:timing>
 </p:sld>
 </file>
 
@@ -4233,9 +4121,21 @@
           <a:p>
             <a:r>
               <a:rPr lang="nb-NO" dirty="0" smtClean="0"/>
-              <a:t>Group goals</a:t>
-            </a:r>
-            <a:endParaRPr lang="nb-NO" dirty="0"/>
+              <a:t>TDT4290 </a:t>
+            </a:r>
+            <a:r>
+              <a:rPr lang="nb-NO" dirty="0" err="1" smtClean="0"/>
+              <a:t>Customer</a:t>
+            </a:r>
+            <a:r>
+              <a:rPr lang="nb-NO" dirty="0" smtClean="0"/>
+              <a:t> driven </a:t>
+            </a:r>
+            <a:r>
+              <a:rPr lang="nb-NO" dirty="0" err="1" smtClean="0"/>
+              <a:t>project</a:t>
+            </a:r>
+            <a:endParaRPr lang="en-GB" dirty="0"/>
           </a:p>
         </p:txBody>
       </p:sp>
@@ -4256,54 +4156,51 @@
           <a:p>
             <a:r>
               <a:rPr lang="en-GB" dirty="0" smtClean="0"/>
-              <a:t>Improve programming skills.</a:t>
-            </a:r>
-          </a:p>
-          <a:p>
+              <a:t>E</a:t>
+            </a:r>
             <a:r>
               <a:rPr lang="en-GB" dirty="0" smtClean="0"/>
-              <a:t>Learn to develop software efficiently.</a:t>
+              <a:t>xperience in a realistic work environment</a:t>
             </a:r>
           </a:p>
           <a:p>
             <a:r>
               <a:rPr lang="en-GB" dirty="0" smtClean="0"/>
-              <a:t>Learn to work in a realistic </a:t>
-            </a:r>
-            <a:r>
-              <a:rPr lang="en-GB" dirty="0" err="1" smtClean="0"/>
-              <a:t>enviroment</a:t>
-            </a:r>
+              <a:t>External customer defines the task</a:t>
+            </a:r>
+          </a:p>
+          <a:p>
             <a:r>
               <a:rPr lang="en-GB" dirty="0" smtClean="0"/>
-              <a:t>.</a:t>
+              <a:t>6 – 7 students</a:t>
             </a:r>
           </a:p>
           <a:p>
             <a:r>
               <a:rPr lang="en-GB" dirty="0" smtClean="0"/>
-              <a:t>To fulfil the needs of the customer.</a:t>
-            </a:r>
+              <a:t>Product and report</a:t>
+            </a:r>
+            <a:endParaRPr lang="en-GB" b="1" dirty="0" smtClean="0"/>
           </a:p>
         </p:txBody>
       </p:sp>
     </p:spTree>
     <p:extLst>
       <p:ext uri="{BB962C8B-B14F-4D97-AF65-F5344CB8AC3E}">
-        <p14:creationId xmlns:p14="http://schemas.microsoft.com/office/powerpoint/2010/main" val="4179239219"/>
+        <p14:creationId xmlns:p14="http://schemas.microsoft.com/office/powerpoint/2010/main" val="752289312"/>
       </p:ext>
     </p:extLst>
   </p:cSld>
   <p:clrMapOvr>
     <a:masterClrMapping/>
   </p:clrMapOvr>
-  <p:transition spd="slow">
+  <p:transition xmlns:p14="http://schemas.microsoft.com/office/powerpoint/2010/main" spd="slow">
     <p:push dir="u"/>
   </p:transition>
   <p:timing>
     <p:tnLst>
       <p:par>
-        <p:cTn id="1" dur="indefinite" restart="never" nodeType="tmRoot"/>
+        <p:cTn xmlns:p14="http://schemas.microsoft.com/office/powerpoint/2010/main" id="1" dur="indefinite" restart="never" nodeType="tmRoot"/>
       </p:par>
     </p:tnLst>
   </p:timing>
@@ -4329,430 +4226,13 @@
       </p:grpSpPr>
       <p:sp>
         <p:nvSpPr>
-          <p:cNvPr id="2" name="Tittel 1"/>
-          <p:cNvSpPr>
-            <a:spLocks noGrp="1"/>
-          </p:cNvSpPr>
-          <p:nvPr>
-            <p:ph type="title"/>
-          </p:nvPr>
-        </p:nvSpPr>
-        <p:spPr/>
-        <p:txBody>
-          <a:bodyPr/>
-          <a:lstStyle/>
-          <a:p>
-            <a:r>
-              <a:rPr lang="nb-NO" dirty="0" smtClean="0"/>
-              <a:t>TDT4290 </a:t>
-            </a:r>
-            <a:r>
-              <a:rPr lang="nb-NO" dirty="0" err="1" smtClean="0"/>
-              <a:t>Customer</a:t>
-            </a:r>
-            <a:r>
-              <a:rPr lang="nb-NO" dirty="0" smtClean="0"/>
-              <a:t> driven </a:t>
-            </a:r>
-            <a:r>
-              <a:rPr lang="nb-NO" dirty="0" err="1" smtClean="0"/>
-              <a:t>project</a:t>
-            </a:r>
-            <a:endParaRPr lang="en-GB" dirty="0"/>
-          </a:p>
-        </p:txBody>
-      </p:sp>
-      <p:sp>
-        <p:nvSpPr>
-          <p:cNvPr id="3" name="Plassholder for innhold 2"/>
-          <p:cNvSpPr>
-            <a:spLocks noGrp="1"/>
-          </p:cNvSpPr>
-          <p:nvPr>
-            <p:ph idx="1"/>
-          </p:nvPr>
-        </p:nvSpPr>
-        <p:spPr/>
-        <p:txBody>
-          <a:bodyPr/>
-          <a:lstStyle/>
-          <a:p>
-            <a:r>
-              <a:rPr lang="nb-NO" dirty="0" smtClean="0"/>
-              <a:t>Purpose: </a:t>
-            </a:r>
-            <a:r>
-              <a:rPr lang="nb-NO" dirty="0" err="1" smtClean="0"/>
-              <a:t>Give</a:t>
-            </a:r>
-            <a:r>
-              <a:rPr lang="nb-NO" dirty="0" smtClean="0"/>
-              <a:t> students </a:t>
-            </a:r>
-            <a:r>
-              <a:rPr lang="nb-NO" dirty="0" err="1" smtClean="0"/>
-              <a:t>experience</a:t>
-            </a:r>
-            <a:r>
-              <a:rPr lang="nb-NO" dirty="0" smtClean="0"/>
-              <a:t> in a </a:t>
-            </a:r>
-            <a:r>
-              <a:rPr lang="nb-NO" dirty="0" err="1" smtClean="0"/>
-              <a:t>realistic</a:t>
-            </a:r>
-            <a:r>
-              <a:rPr lang="nb-NO" dirty="0" smtClean="0"/>
-              <a:t> </a:t>
-            </a:r>
-            <a:r>
-              <a:rPr lang="nb-NO" dirty="0" err="1" smtClean="0"/>
-              <a:t>work</a:t>
-            </a:r>
-            <a:r>
-              <a:rPr lang="nb-NO" dirty="0" smtClean="0"/>
-              <a:t> </a:t>
-            </a:r>
-            <a:r>
-              <a:rPr lang="nb-NO" dirty="0" err="1" smtClean="0"/>
-              <a:t>enviroment</a:t>
-            </a:r>
-            <a:endParaRPr lang="nb-NO" dirty="0" smtClean="0"/>
-          </a:p>
-          <a:p>
-            <a:r>
-              <a:rPr lang="nb-NO" dirty="0" err="1" smtClean="0"/>
-              <a:t>External</a:t>
-            </a:r>
-            <a:r>
-              <a:rPr lang="nb-NO" dirty="0" smtClean="0"/>
-              <a:t> </a:t>
-            </a:r>
-            <a:r>
-              <a:rPr lang="nb-NO" dirty="0" err="1" smtClean="0"/>
-              <a:t>customer</a:t>
-            </a:r>
-            <a:r>
-              <a:rPr lang="nb-NO" dirty="0" smtClean="0"/>
-              <a:t> </a:t>
-            </a:r>
-            <a:r>
-              <a:rPr lang="nb-NO" dirty="0" err="1" smtClean="0"/>
-              <a:t>defines</a:t>
-            </a:r>
-            <a:r>
-              <a:rPr lang="nb-NO" dirty="0" smtClean="0"/>
-              <a:t> </a:t>
-            </a:r>
-            <a:r>
-              <a:rPr lang="nb-NO" dirty="0" err="1" smtClean="0"/>
-              <a:t>the</a:t>
-            </a:r>
-            <a:r>
-              <a:rPr lang="nb-NO" dirty="0" smtClean="0"/>
-              <a:t> </a:t>
-            </a:r>
-            <a:r>
-              <a:rPr lang="nb-NO" dirty="0" err="1" smtClean="0"/>
-              <a:t>task</a:t>
-            </a:r>
-            <a:endParaRPr lang="nb-NO" dirty="0"/>
-          </a:p>
-          <a:p>
-            <a:r>
-              <a:rPr lang="nb-NO" dirty="0" smtClean="0"/>
-              <a:t>A </a:t>
-            </a:r>
-            <a:r>
-              <a:rPr lang="nb-NO" dirty="0" err="1" smtClean="0"/>
-              <a:t>group</a:t>
-            </a:r>
-            <a:r>
-              <a:rPr lang="nb-NO" dirty="0" smtClean="0"/>
-              <a:t> </a:t>
-            </a:r>
-            <a:r>
-              <a:rPr lang="nb-NO" dirty="0" err="1" smtClean="0"/>
-              <a:t>of</a:t>
-            </a:r>
-            <a:r>
-              <a:rPr lang="nb-NO" dirty="0" smtClean="0"/>
-              <a:t> 6-7 </a:t>
-            </a:r>
-            <a:r>
-              <a:rPr lang="nb-NO" dirty="0" err="1" smtClean="0"/>
-              <a:t>people</a:t>
-            </a:r>
-            <a:r>
-              <a:rPr lang="nb-NO" dirty="0" smtClean="0"/>
-              <a:t> </a:t>
-            </a:r>
-            <a:r>
-              <a:rPr lang="nb-NO" dirty="0" err="1" smtClean="0"/>
-              <a:t>are</a:t>
-            </a:r>
-            <a:r>
-              <a:rPr lang="nb-NO" dirty="0" smtClean="0"/>
-              <a:t> </a:t>
-            </a:r>
-            <a:r>
-              <a:rPr lang="nb-NO" dirty="0" err="1" smtClean="0"/>
-              <a:t>assign</a:t>
-            </a:r>
-            <a:r>
-              <a:rPr lang="nb-NO" dirty="0" err="1" smtClean="0"/>
-              <a:t>ed</a:t>
-            </a:r>
-            <a:r>
-              <a:rPr lang="nb-NO" dirty="0" smtClean="0"/>
-              <a:t> </a:t>
-            </a:r>
-            <a:r>
-              <a:rPr lang="nb-NO" dirty="0" err="1" smtClean="0"/>
-              <a:t>randomly</a:t>
-            </a:r>
-            <a:r>
-              <a:rPr lang="nb-NO" dirty="0" smtClean="0"/>
-              <a:t> to </a:t>
-            </a:r>
-            <a:r>
-              <a:rPr lang="nb-NO" dirty="0" err="1" smtClean="0"/>
-              <a:t>each</a:t>
-            </a:r>
-            <a:r>
-              <a:rPr lang="nb-NO" dirty="0" smtClean="0"/>
-              <a:t> </a:t>
-            </a:r>
-            <a:r>
-              <a:rPr lang="nb-NO" dirty="0" err="1" smtClean="0"/>
-              <a:t>task</a:t>
-            </a:r>
-            <a:endParaRPr lang="nb-NO" dirty="0" smtClean="0"/>
-          </a:p>
-          <a:p>
-            <a:r>
-              <a:rPr lang="nb-NO" dirty="0" err="1" smtClean="0"/>
-              <a:t>Should</a:t>
-            </a:r>
-            <a:r>
-              <a:rPr lang="nb-NO" dirty="0" smtClean="0"/>
-              <a:t> </a:t>
-            </a:r>
-            <a:r>
-              <a:rPr lang="nb-NO" dirty="0" err="1" smtClean="0"/>
-              <a:t>result</a:t>
-            </a:r>
-            <a:r>
-              <a:rPr lang="nb-NO" dirty="0" smtClean="0"/>
-              <a:t> in a </a:t>
-            </a:r>
-            <a:r>
-              <a:rPr lang="nb-NO" dirty="0" err="1" smtClean="0"/>
-              <a:t>product</a:t>
-            </a:r>
-            <a:r>
-              <a:rPr lang="nb-NO" dirty="0" smtClean="0"/>
-              <a:t> for </a:t>
-            </a:r>
-            <a:r>
-              <a:rPr lang="nb-NO" dirty="0" err="1" smtClean="0"/>
-              <a:t>the</a:t>
-            </a:r>
-            <a:r>
-              <a:rPr lang="nb-NO" dirty="0" smtClean="0"/>
-              <a:t> </a:t>
-            </a:r>
-            <a:r>
-              <a:rPr lang="nb-NO" dirty="0" err="1" smtClean="0"/>
-              <a:t>customer</a:t>
-            </a:r>
-            <a:r>
-              <a:rPr lang="nb-NO" dirty="0" smtClean="0"/>
-              <a:t> </a:t>
-            </a:r>
-            <a:r>
-              <a:rPr lang="nb-NO" dirty="0" err="1" smtClean="0"/>
-              <a:t>that</a:t>
-            </a:r>
-            <a:r>
-              <a:rPr lang="nb-NO" dirty="0" smtClean="0"/>
-              <a:t> is </a:t>
-            </a:r>
-            <a:r>
-              <a:rPr lang="nb-NO" dirty="0" err="1" smtClean="0"/>
-              <a:t>documented</a:t>
-            </a:r>
-            <a:r>
-              <a:rPr lang="nb-NO" dirty="0" smtClean="0"/>
-              <a:t> in a report</a:t>
-            </a:r>
-          </a:p>
-        </p:txBody>
-      </p:sp>
-    </p:spTree>
-    <p:extLst>
-      <p:ext uri="{BB962C8B-B14F-4D97-AF65-F5344CB8AC3E}">
-        <p14:creationId xmlns:p14="http://schemas.microsoft.com/office/powerpoint/2010/main" val="752289312"/>
-      </p:ext>
-    </p:extLst>
-  </p:cSld>
-  <p:clrMapOvr>
-    <a:masterClrMapping/>
-  </p:clrMapOvr>
-</p:sld>
-</file>
-
-<file path=ppt/slides/slide6.xml><?xml version="1.0" encoding="utf-8"?>
-<p:sld xmlns:a="http://schemas.openxmlformats.org/drawingml/2006/main" xmlns:r="http://schemas.openxmlformats.org/officeDocument/2006/relationships" xmlns:p="http://schemas.openxmlformats.org/presentationml/2006/main">
-  <p:cSld>
-    <p:spTree>
-      <p:nvGrpSpPr>
-        <p:cNvPr id="1" name=""/>
-        <p:cNvGrpSpPr/>
-        <p:nvPr/>
-      </p:nvGrpSpPr>
-      <p:grpSpPr>
-        <a:xfrm>
-          <a:off x="0" y="0"/>
-          <a:ext cx="0" cy="0"/>
-          <a:chOff x="0" y="0"/>
-          <a:chExt cx="0" cy="0"/>
-        </a:xfrm>
-      </p:grpSpPr>
-      <p:sp>
-        <p:nvSpPr>
-          <p:cNvPr id="2" name="Tittel 1"/>
-          <p:cNvSpPr>
-            <a:spLocks noGrp="1"/>
-          </p:cNvSpPr>
-          <p:nvPr>
-            <p:ph type="title"/>
-          </p:nvPr>
-        </p:nvSpPr>
-        <p:spPr/>
-        <p:txBody>
-          <a:bodyPr/>
-          <a:lstStyle/>
-          <a:p>
-            <a:r>
-              <a:rPr lang="nb-NO" dirty="0" smtClean="0"/>
-              <a:t>The </a:t>
-            </a:r>
-            <a:r>
-              <a:rPr lang="nb-NO" dirty="0" err="1" smtClean="0"/>
-              <a:t>task</a:t>
-            </a:r>
-            <a:endParaRPr lang="nb-NO" dirty="0"/>
-          </a:p>
-        </p:txBody>
-      </p:sp>
-      <p:sp>
-        <p:nvSpPr>
-          <p:cNvPr id="3" name="Plassholder for innhold 2"/>
-          <p:cNvSpPr>
-            <a:spLocks noGrp="1"/>
-          </p:cNvSpPr>
-          <p:nvPr>
-            <p:ph idx="1"/>
-          </p:nvPr>
-        </p:nvSpPr>
-        <p:spPr/>
-        <p:txBody>
-          <a:bodyPr/>
-          <a:lstStyle/>
-          <a:p>
-            <a:r>
-              <a:rPr lang="en-US" dirty="0" smtClean="0"/>
-              <a:t>Generate</a:t>
-            </a:r>
-            <a:r>
-              <a:rPr lang="en-US" dirty="0" smtClean="0"/>
-              <a:t> </a:t>
-            </a:r>
-            <a:r>
-              <a:rPr lang="en-US" dirty="0" err="1" smtClean="0"/>
-              <a:t>lua</a:t>
-            </a:r>
-            <a:r>
-              <a:rPr lang="en-US" dirty="0" smtClean="0"/>
-              <a:t> dissectors for C structs.</a:t>
-            </a:r>
-          </a:p>
-          <a:p>
-            <a:r>
-              <a:rPr lang="en-US" dirty="0" smtClean="0"/>
-              <a:t>Provide various configuration options for the dissectors</a:t>
-            </a:r>
-          </a:p>
-          <a:p>
-            <a:r>
-              <a:rPr lang="en-US" dirty="0" smtClean="0"/>
-              <a:t>Dissectors make debugging of inter-process communication easier</a:t>
-            </a:r>
-          </a:p>
-          <a:p>
-            <a:r>
-              <a:rPr lang="en-US" dirty="0" smtClean="0"/>
-              <a:t>Thales has 3000 header files that may contain struct definitions.</a:t>
-            </a:r>
-          </a:p>
-          <a:p>
-            <a:r>
-              <a:rPr lang="en-US" dirty="0" smtClean="0"/>
-              <a:t>The result should be able to run all of these.</a:t>
-            </a:r>
-          </a:p>
-        </p:txBody>
-      </p:sp>
-    </p:spTree>
-    <p:extLst>
-      <p:ext uri="{BB962C8B-B14F-4D97-AF65-F5344CB8AC3E}">
-        <p14:creationId xmlns:p14="http://schemas.microsoft.com/office/powerpoint/2010/main" val="326664058"/>
-      </p:ext>
-    </p:extLst>
-  </p:cSld>
-  <p:clrMapOvr>
-    <a:masterClrMapping/>
-  </p:clrMapOvr>
-  <p:transition spd="slow">
-    <p:push dir="u"/>
-  </p:transition>
-  <p:timing>
-    <p:tnLst>
-      <p:par>
-        <p:cTn id="1" dur="indefinite" restart="never" nodeType="tmRoot"/>
-      </p:par>
-    </p:tnLst>
-  </p:timing>
-</p:sld>
-</file>
-
-<file path=ppt/slides/slide7.xml><?xml version="1.0" encoding="utf-8"?>
-<p:sld xmlns:a="http://schemas.openxmlformats.org/drawingml/2006/main" xmlns:r="http://schemas.openxmlformats.org/officeDocument/2006/relationships" xmlns:p="http://schemas.openxmlformats.org/presentationml/2006/main">
-  <p:cSld>
-    <p:spTree>
-      <p:nvGrpSpPr>
-        <p:cNvPr id="1" name=""/>
-        <p:cNvGrpSpPr/>
-        <p:nvPr/>
-      </p:nvGrpSpPr>
-      <p:grpSpPr>
-        <a:xfrm>
-          <a:off x="0" y="0"/>
-          <a:ext cx="0" cy="0"/>
-          <a:chOff x="0" y="0"/>
-          <a:chExt cx="0" cy="0"/>
-        </a:xfrm>
-      </p:grpSpPr>
-      <p:sp>
-        <p:nvSpPr>
           <p:cNvPr id="4" name="Avrundet rektangel 3"/>
           <p:cNvSpPr/>
           <p:nvPr/>
         </p:nvSpPr>
         <p:spPr>
           <a:xfrm>
-            <a:off x="581186" y="1015136"/>
+            <a:off x="581186" y="1542076"/>
             <a:ext cx="2138766" cy="2038030"/>
           </a:xfrm>
           <a:prstGeom prst="roundRect">
@@ -4793,7 +4273,7 @@
         </p:nvSpPr>
         <p:spPr>
           <a:xfrm>
-            <a:off x="6369803" y="1015136"/>
+            <a:off x="6369803" y="1542076"/>
             <a:ext cx="2123267" cy="2038029"/>
           </a:xfrm>
           <a:prstGeom prst="roundRect">
@@ -4837,7 +4317,7 @@
         </p:nvCxnSpPr>
         <p:spPr>
           <a:xfrm>
-            <a:off x="2719952" y="2034151"/>
+            <a:off x="2719952" y="2561091"/>
             <a:ext cx="3649851" cy="0"/>
           </a:xfrm>
           <a:prstGeom prst="straightConnector1">
@@ -4870,8 +4350,8 @@
         </p:nvSpPr>
         <p:spPr>
           <a:xfrm>
-            <a:off x="741974" y="1456839"/>
-            <a:ext cx="1844299" cy="1495587"/>
+            <a:off x="741974" y="1983779"/>
+            <a:ext cx="1844299" cy="1596326"/>
           </a:xfrm>
           <a:prstGeom prst="roundRect">
             <a:avLst/>
@@ -4934,8 +4414,8 @@
         </p:nvSpPr>
         <p:spPr>
           <a:xfrm>
-            <a:off x="6522202" y="1456838"/>
-            <a:ext cx="1844299" cy="1495588"/>
+            <a:off x="6522202" y="1983779"/>
+            <a:ext cx="1844299" cy="1596327"/>
           </a:xfrm>
           <a:prstGeom prst="roundRect">
             <a:avLst/>
@@ -4998,7 +4478,7 @@
         </p:nvSpPr>
         <p:spPr>
           <a:xfrm>
-            <a:off x="2719952" y="1542076"/>
+            <a:off x="2719952" y="2078946"/>
             <a:ext cx="1621183" cy="395208"/>
           </a:xfrm>
           <a:prstGeom prst="rect">
@@ -5084,8 +4564,8 @@
         </p:nvCxnSpPr>
         <p:spPr>
           <a:xfrm>
-            <a:off x="4534864" y="1456839"/>
-            <a:ext cx="0" cy="2386742"/>
+            <a:off x="4534864" y="2199103"/>
+            <a:ext cx="0" cy="1644478"/>
           </a:xfrm>
           <a:prstGeom prst="line">
             <a:avLst/>
@@ -5157,7 +4637,7 @@
         <p:spPr>
           <a:xfrm>
             <a:off x="3620788" y="4382145"/>
-            <a:ext cx="1848177" cy="1526583"/>
+            <a:ext cx="1848177" cy="1636995"/>
           </a:xfrm>
           <a:prstGeom prst="roundRect">
             <a:avLst/>
@@ -5201,8 +4681,13 @@
           <a:p>
             <a:r>
               <a:rPr lang="nb-NO" sz="1600" dirty="0"/>
-              <a:t>  char* =  ‘abc’</a:t>
-            </a:r>
+              <a:t>  char* =  ‘abc</a:t>
+            </a:r>
+            <a:r>
+              <a:rPr lang="nb-NO" sz="1600" dirty="0" smtClean="0"/>
+              <a:t>’;</a:t>
+            </a:r>
+            <a:endParaRPr lang="nb-NO" sz="1600" dirty="0"/>
           </a:p>
           <a:p>
             <a:r>
@@ -5213,6 +4698,41 @@
           <a:p>
             <a:pPr algn="ctr"/>
             <a:endParaRPr lang="nb-NO" dirty="0"/>
+          </a:p>
+        </p:txBody>
+      </p:sp>
+      <p:sp>
+        <p:nvSpPr>
+          <p:cNvPr id="2" name="Tittel 1"/>
+          <p:cNvSpPr>
+            <a:spLocks noGrp="1"/>
+          </p:cNvSpPr>
+          <p:nvPr>
+            <p:ph type="title"/>
+          </p:nvPr>
+        </p:nvSpPr>
+        <p:spPr/>
+        <p:txBody>
+          <a:bodyPr/>
+          <a:lstStyle/>
+          <a:p>
+            <a:r>
+              <a:rPr lang="nb-NO" sz="4400" dirty="0" smtClean="0"/>
+              <a:t>Inter-</a:t>
+            </a:r>
+            <a:r>
+              <a:rPr lang="nb-NO" sz="4400" dirty="0" err="1" smtClean="0"/>
+              <a:t>process</a:t>
+            </a:r>
+            <a:r>
+              <a:rPr lang="nb-NO" sz="4400" dirty="0" smtClean="0"/>
+              <a:t> </a:t>
+            </a:r>
+            <a:r>
+              <a:rPr lang="nb-NO" sz="4400" dirty="0" err="1" smtClean="0"/>
+              <a:t>communication</a:t>
+            </a:r>
+            <a:endParaRPr lang="nb-NO" sz="4400" dirty="0"/>
           </a:p>
         </p:txBody>
       </p:sp>
@@ -5226,13 +4746,13 @@
   <p:clrMapOvr>
     <a:masterClrMapping/>
   </p:clrMapOvr>
-  <p:transition spd="slow">
+  <p:transition xmlns:p14="http://schemas.microsoft.com/office/powerpoint/2010/main" spd="slow">
     <p:push dir="u"/>
   </p:transition>
   <p:timing>
     <p:tnLst>
       <p:par>
-        <p:cTn id="1" dur="indefinite" restart="never" nodeType="tmRoot">
+        <p:cTn xmlns:p14="http://schemas.microsoft.com/office/powerpoint/2010/main" id="1" dur="indefinite" restart="never" nodeType="tmRoot">
           <p:childTnLst>
             <p:seq concurrent="1" nextAc="seek">
               <p:cTn id="2" dur="indefinite" nodeType="mainSeq">
@@ -5592,6 +5112,317 @@
 </p:sld>
 </file>
 
+<file path=ppt/slides/slide6.xml><?xml version="1.0" encoding="utf-8"?>
+<p:sld xmlns:a="http://schemas.openxmlformats.org/drawingml/2006/main" xmlns:r="http://schemas.openxmlformats.org/officeDocument/2006/relationships" xmlns:p="http://schemas.openxmlformats.org/presentationml/2006/main">
+  <p:cSld>
+    <p:spTree>
+      <p:nvGrpSpPr>
+        <p:cNvPr id="1" name=""/>
+        <p:cNvGrpSpPr/>
+        <p:nvPr/>
+      </p:nvGrpSpPr>
+      <p:grpSpPr>
+        <a:xfrm>
+          <a:off x="0" y="0"/>
+          <a:ext cx="0" cy="0"/>
+          <a:chOff x="0" y="0"/>
+          <a:chExt cx="0" cy="0"/>
+        </a:xfrm>
+      </p:grpSpPr>
+      <p:sp>
+        <p:nvSpPr>
+          <p:cNvPr id="2" name="Tittel 1"/>
+          <p:cNvSpPr>
+            <a:spLocks noGrp="1"/>
+          </p:cNvSpPr>
+          <p:nvPr>
+            <p:ph type="title"/>
+          </p:nvPr>
+        </p:nvSpPr>
+        <p:spPr/>
+        <p:txBody>
+          <a:bodyPr/>
+          <a:lstStyle/>
+          <a:p>
+            <a:r>
+              <a:rPr lang="nb-NO" dirty="0" smtClean="0"/>
+              <a:t>The </a:t>
+            </a:r>
+            <a:r>
+              <a:rPr lang="nb-NO" dirty="0" err="1" smtClean="0"/>
+              <a:t>task</a:t>
+            </a:r>
+            <a:endParaRPr lang="nb-NO" dirty="0"/>
+          </a:p>
+        </p:txBody>
+      </p:sp>
+      <p:sp>
+        <p:nvSpPr>
+          <p:cNvPr id="3" name="Plassholder for innhold 2"/>
+          <p:cNvSpPr>
+            <a:spLocks noGrp="1"/>
+          </p:cNvSpPr>
+          <p:nvPr>
+            <p:ph idx="1"/>
+          </p:nvPr>
+        </p:nvSpPr>
+        <p:spPr/>
+        <p:txBody>
+          <a:bodyPr/>
+          <a:lstStyle/>
+          <a:p>
+            <a:endParaRPr lang="en-US" dirty="0" smtClean="0"/>
+          </a:p>
+          <a:p>
+            <a:r>
+              <a:rPr lang="en-US" dirty="0" smtClean="0"/>
+              <a:t>Generate </a:t>
+            </a:r>
+            <a:r>
+              <a:rPr lang="en-US" dirty="0" err="1"/>
+              <a:t>L</a:t>
+            </a:r>
+            <a:r>
+              <a:rPr lang="en-US" dirty="0" err="1" smtClean="0"/>
+              <a:t>ua</a:t>
+            </a:r>
+            <a:r>
+              <a:rPr lang="en-US" dirty="0" smtClean="0"/>
+              <a:t> </a:t>
+            </a:r>
+            <a:r>
+              <a:rPr lang="en-US" dirty="0" smtClean="0"/>
+              <a:t>dissectors for C </a:t>
+            </a:r>
+            <a:r>
+              <a:rPr lang="en-US" dirty="0" err="1" smtClean="0"/>
+              <a:t>structs</a:t>
+            </a:r>
+            <a:r>
+              <a:rPr lang="en-US" dirty="0" smtClean="0"/>
+              <a:t> automatically</a:t>
+            </a:r>
+            <a:endParaRPr lang="en-US" dirty="0" smtClean="0"/>
+          </a:p>
+          <a:p>
+            <a:r>
+              <a:rPr lang="en-US" dirty="0" smtClean="0"/>
+              <a:t>Provide </a:t>
+            </a:r>
+            <a:r>
+              <a:rPr lang="en-US" dirty="0" smtClean="0"/>
+              <a:t>configuration options for the </a:t>
+            </a:r>
+            <a:r>
+              <a:rPr lang="en-US" dirty="0" smtClean="0"/>
+              <a:t>dissectors</a:t>
+            </a:r>
+          </a:p>
+          <a:p>
+            <a:endParaRPr lang="en-US" dirty="0" smtClean="0"/>
+          </a:p>
+        </p:txBody>
+      </p:sp>
+    </p:spTree>
+    <p:extLst>
+      <p:ext uri="{BB962C8B-B14F-4D97-AF65-F5344CB8AC3E}">
+        <p14:creationId xmlns:p14="http://schemas.microsoft.com/office/powerpoint/2010/main" val="326664058"/>
+      </p:ext>
+    </p:extLst>
+  </p:cSld>
+  <p:clrMapOvr>
+    <a:masterClrMapping/>
+  </p:clrMapOvr>
+  <p:transition xmlns:p14="http://schemas.microsoft.com/office/powerpoint/2010/main" spd="slow">
+    <p:push dir="u"/>
+  </p:transition>
+  <p:timing>
+    <p:tnLst>
+      <p:par>
+        <p:cTn xmlns:p14="http://schemas.microsoft.com/office/powerpoint/2010/main" id="1" dur="indefinite" restart="never" nodeType="tmRoot"/>
+      </p:par>
+    </p:tnLst>
+  </p:timing>
+</p:sld>
+</file>
+
+<file path=ppt/slides/slide7.xml><?xml version="1.0" encoding="utf-8"?>
+<p:sld xmlns:a="http://schemas.openxmlformats.org/drawingml/2006/main" xmlns:r="http://schemas.openxmlformats.org/officeDocument/2006/relationships" xmlns:p="http://schemas.openxmlformats.org/presentationml/2006/main">
+  <p:cSld>
+    <p:spTree>
+      <p:nvGrpSpPr>
+        <p:cNvPr id="1" name=""/>
+        <p:cNvGrpSpPr/>
+        <p:nvPr/>
+      </p:nvGrpSpPr>
+      <p:grpSpPr>
+        <a:xfrm>
+          <a:off x="0" y="0"/>
+          <a:ext cx="0" cy="0"/>
+          <a:chOff x="0" y="0"/>
+          <a:chExt cx="0" cy="0"/>
+        </a:xfrm>
+      </p:grpSpPr>
+      <p:sp>
+        <p:nvSpPr>
+          <p:cNvPr id="2" name="Tittel 1"/>
+          <p:cNvSpPr>
+            <a:spLocks noGrp="1"/>
+          </p:cNvSpPr>
+          <p:nvPr>
+            <p:ph type="title"/>
+          </p:nvPr>
+        </p:nvSpPr>
+        <p:spPr/>
+        <p:txBody>
+          <a:bodyPr/>
+          <a:lstStyle/>
+          <a:p>
+            <a:r>
+              <a:rPr lang="nb-NO" dirty="0" smtClean="0"/>
+              <a:t>Dissectors</a:t>
+            </a:r>
+            <a:endParaRPr lang="nb-NO" dirty="0"/>
+          </a:p>
+        </p:txBody>
+      </p:sp>
+      <p:sp>
+        <p:nvSpPr>
+          <p:cNvPr id="3" name="Plassholder for innhold 2"/>
+          <p:cNvSpPr>
+            <a:spLocks noGrp="1"/>
+          </p:cNvSpPr>
+          <p:nvPr>
+            <p:ph idx="1"/>
+          </p:nvPr>
+        </p:nvSpPr>
+        <p:spPr/>
+        <p:txBody>
+          <a:bodyPr/>
+          <a:lstStyle/>
+          <a:p>
+            <a:r>
+              <a:rPr lang="nb-NO" dirty="0" smtClean="0"/>
+              <a:t>Wireshark can be extended </a:t>
+            </a:r>
+            <a:r>
+              <a:rPr lang="nb-NO" dirty="0" err="1" smtClean="0"/>
+              <a:t>with</a:t>
+            </a:r>
+            <a:r>
+              <a:rPr lang="nb-NO" dirty="0" smtClean="0"/>
+              <a:t> </a:t>
+            </a:r>
+            <a:r>
+              <a:rPr lang="nb-NO" dirty="0" err="1" smtClean="0"/>
+              <a:t>dissectors</a:t>
+            </a:r>
+            <a:endParaRPr lang="nb-NO" dirty="0" smtClean="0"/>
+          </a:p>
+          <a:p>
+            <a:r>
+              <a:rPr lang="nb-NO" dirty="0" err="1" smtClean="0"/>
+              <a:t>Decodes</a:t>
+            </a:r>
+            <a:r>
+              <a:rPr lang="nb-NO" dirty="0" smtClean="0"/>
+              <a:t> </a:t>
+            </a:r>
+            <a:r>
+              <a:rPr lang="nb-NO" dirty="0" err="1" smtClean="0"/>
+              <a:t>the</a:t>
+            </a:r>
+            <a:r>
+              <a:rPr lang="nb-NO" dirty="0" smtClean="0"/>
+              <a:t> </a:t>
+            </a:r>
+            <a:r>
+              <a:rPr lang="nb-NO" dirty="0" smtClean="0"/>
+              <a:t>structure </a:t>
+            </a:r>
+            <a:r>
+              <a:rPr lang="nb-NO" dirty="0" err="1" smtClean="0"/>
+              <a:t>of</a:t>
+            </a:r>
+            <a:r>
+              <a:rPr lang="nb-NO" dirty="0" smtClean="0"/>
+              <a:t> </a:t>
+            </a:r>
+            <a:r>
+              <a:rPr lang="nb-NO" dirty="0"/>
+              <a:t>a</a:t>
+            </a:r>
+            <a:r>
+              <a:rPr lang="nb-NO" dirty="0" smtClean="0"/>
+              <a:t> </a:t>
+            </a:r>
+            <a:r>
+              <a:rPr lang="nb-NO" dirty="0" err="1" smtClean="0"/>
+              <a:t>message</a:t>
+            </a:r>
+            <a:endParaRPr lang="nb-NO" dirty="0" smtClean="0"/>
+          </a:p>
+          <a:p>
+            <a:r>
+              <a:rPr lang="nb-NO" dirty="0" err="1" smtClean="0"/>
+              <a:t>Takes</a:t>
+            </a:r>
+            <a:r>
+              <a:rPr lang="nb-NO" dirty="0" smtClean="0"/>
+              <a:t> </a:t>
+            </a:r>
+            <a:r>
+              <a:rPr lang="nb-NO" dirty="0" smtClean="0"/>
+              <a:t>from 15 minutes – 1 hour to </a:t>
+            </a:r>
+            <a:r>
+              <a:rPr lang="nb-NO" dirty="0" smtClean="0"/>
+              <a:t>make</a:t>
+            </a:r>
+            <a:endParaRPr lang="nb-NO" dirty="0" smtClean="0"/>
+          </a:p>
+          <a:p>
+            <a:r>
+              <a:rPr lang="nb-NO" dirty="0" err="1" smtClean="0"/>
+              <a:t>Requires</a:t>
+            </a:r>
+            <a:r>
+              <a:rPr lang="nb-NO" dirty="0" smtClean="0"/>
+              <a:t> </a:t>
+            </a:r>
+            <a:r>
+              <a:rPr lang="nb-NO" dirty="0" smtClean="0"/>
+              <a:t>knowledge about C memory layout and Wireshark API.</a:t>
+            </a:r>
+          </a:p>
+          <a:p>
+            <a:endParaRPr lang="nb-NO" dirty="0"/>
+          </a:p>
+        </p:txBody>
+      </p:sp>
+    </p:spTree>
+    <p:extLst>
+      <p:ext uri="{BB962C8B-B14F-4D97-AF65-F5344CB8AC3E}">
+        <p14:creationId xmlns:p14="http://schemas.microsoft.com/office/powerpoint/2010/main" val="2832160107"/>
+      </p:ext>
+    </p:extLst>
+  </p:cSld>
+  <p:clrMapOvr>
+    <a:masterClrMapping/>
+  </p:clrMapOvr>
+  <p:transition xmlns:p14="http://schemas.microsoft.com/office/powerpoint/2010/main" spd="slow">
+    <p:push dir="u"/>
+  </p:transition>
+  <p:timing>
+    <p:tnLst>
+      <p:par>
+        <p:cTn xmlns:p14="http://schemas.microsoft.com/office/powerpoint/2010/main" id="1" dur="indefinite" restart="never" nodeType="tmRoot"/>
+      </p:par>
+    </p:tnLst>
+  </p:timing>
+</p:sld>
+</file>
+
 <file path=ppt/slides/slide8.xml><?xml version="1.0" encoding="utf-8"?>
 <p:sld xmlns:a="http://schemas.openxmlformats.org/drawingml/2006/main" xmlns:r="http://schemas.openxmlformats.org/officeDocument/2006/relationships" xmlns:p="http://schemas.openxmlformats.org/presentationml/2006/main">
   <p:cSld>
@@ -5625,10 +5456,10 @@
           <a:lstStyle/>
           <a:p>
             <a:r>
-              <a:rPr lang="nb-NO" dirty="0" smtClean="0"/>
-              <a:t>Dissectors</a:t>
-            </a:r>
-            <a:endParaRPr lang="nb-NO" dirty="0"/>
+              <a:rPr lang="en-GB" dirty="0" smtClean="0"/>
+              <a:t>The process</a:t>
+            </a:r>
+            <a:endParaRPr lang="en-GB" dirty="0"/>
           </a:p>
         </p:txBody>
       </p:sp>
@@ -5648,64 +5479,74 @@
           <a:lstStyle/>
           <a:p>
             <a:r>
-              <a:rPr lang="nb-NO" dirty="0" smtClean="0"/>
-              <a:t>Wireshark can be extended with dissectors.</a:t>
-            </a:r>
-          </a:p>
-          <a:p>
-            <a:r>
-              <a:rPr lang="nb-NO" dirty="0" smtClean="0"/>
-              <a:t>A dissector knows the structure of the message</a:t>
-            </a:r>
-            <a:r>
-              <a:rPr lang="nb-NO" dirty="0"/>
-              <a:t> </a:t>
-            </a:r>
-            <a:r>
-              <a:rPr lang="nb-NO" dirty="0" smtClean="0"/>
-              <a:t>and and can represent it beautifully.</a:t>
-            </a:r>
-          </a:p>
-          <a:p>
-            <a:r>
-              <a:rPr lang="nb-NO" dirty="0" smtClean="0"/>
-              <a:t>Takes from 15 minutes – 1 hour to make.</a:t>
-            </a:r>
-          </a:p>
-          <a:p>
-            <a:r>
-              <a:rPr lang="nb-NO" dirty="0" smtClean="0"/>
-              <a:t>Hard or and tideous for large and complex structs.</a:t>
-            </a:r>
-          </a:p>
-          <a:p>
-            <a:r>
-              <a:rPr lang="nb-NO" dirty="0" smtClean="0"/>
-              <a:t>Requires knowledge about C memory layout and Wireshark API.</a:t>
-            </a:r>
-          </a:p>
-          <a:p>
-            <a:endParaRPr lang="nb-NO" dirty="0"/>
+              <a:rPr lang="en-US" dirty="0" smtClean="0"/>
+              <a:t>Pre-study</a:t>
+            </a:r>
+          </a:p>
+          <a:p>
+            <a:pPr lvl="1"/>
+            <a:r>
+              <a:rPr lang="en-US" dirty="0" smtClean="0"/>
+              <a:t>Libraries for preprocessing, parsing and configuration.</a:t>
+            </a:r>
+          </a:p>
+          <a:p>
+            <a:pPr lvl="1"/>
+            <a:r>
+              <a:rPr lang="en-US" dirty="0" smtClean="0"/>
+              <a:t>Python</a:t>
+            </a:r>
+          </a:p>
+          <a:p>
+            <a:pPr lvl="1"/>
+            <a:r>
+              <a:rPr lang="en-US" dirty="0" smtClean="0"/>
+              <a:t>Scrum</a:t>
+            </a:r>
+          </a:p>
+          <a:p>
+            <a:r>
+              <a:rPr lang="en-US" dirty="0" smtClean="0"/>
+              <a:t>4 sprints</a:t>
+            </a:r>
+          </a:p>
+          <a:p>
+            <a:pPr lvl="1"/>
+            <a:r>
+              <a:rPr lang="en-US" dirty="0" smtClean="0"/>
+              <a:t>Incremental releases</a:t>
+            </a:r>
+          </a:p>
+          <a:p>
+            <a:pPr lvl="1"/>
+            <a:r>
+              <a:rPr lang="en-US" dirty="0" smtClean="0"/>
+              <a:t>Continues feedback</a:t>
+            </a:r>
+          </a:p>
+          <a:p>
+            <a:pPr lvl="1"/>
+            <a:endParaRPr lang="en-US" dirty="0" smtClean="0"/>
           </a:p>
         </p:txBody>
       </p:sp>
     </p:spTree>
     <p:extLst>
       <p:ext uri="{BB962C8B-B14F-4D97-AF65-F5344CB8AC3E}">
-        <p14:creationId xmlns:p14="http://schemas.microsoft.com/office/powerpoint/2010/main" val="2832160107"/>
+        <p14:creationId xmlns:p14="http://schemas.microsoft.com/office/powerpoint/2010/main" val="1362037293"/>
       </p:ext>
     </p:extLst>
   </p:cSld>
   <p:clrMapOvr>
     <a:masterClrMapping/>
   </p:clrMapOvr>
-  <p:transition spd="slow">
+  <p:transition xmlns:p14="http://schemas.microsoft.com/office/powerpoint/2010/main" spd="slow">
     <p:push dir="u"/>
   </p:transition>
   <p:timing>
     <p:tnLst>
       <p:par>
-        <p:cTn id="1" dur="indefinite" restart="never" nodeType="tmRoot"/>
+        <p:cTn xmlns:p14="http://schemas.microsoft.com/office/powerpoint/2010/main" id="1" dur="indefinite" restart="never" nodeType="tmRoot"/>
       </p:par>
     </p:tnLst>
   </p:timing>
@@ -5746,7 +5587,7 @@
           <a:p>
             <a:r>
               <a:rPr lang="en-GB" dirty="0" smtClean="0"/>
-              <a:t>The process</a:t>
+              <a:t>CSjark</a:t>
             </a:r>
             <a:endParaRPr lang="en-GB" dirty="0"/>
           </a:p>
@@ -5768,76 +5609,76 @@
           <a:lstStyle/>
           <a:p>
             <a:r>
-              <a:rPr lang="en-US" dirty="0" smtClean="0"/>
-              <a:t>Pre-study</a:t>
-            </a:r>
-          </a:p>
-          <a:p>
-            <a:pPr lvl="1"/>
-            <a:r>
-              <a:rPr lang="en-US" dirty="0" smtClean="0"/>
-              <a:t>Libraries for preprocessing, parsing and configuration.</a:t>
-            </a:r>
-          </a:p>
-          <a:p>
-            <a:pPr lvl="1"/>
-            <a:r>
-              <a:rPr lang="en-US" dirty="0" smtClean="0"/>
-              <a:t>Python</a:t>
-            </a:r>
-          </a:p>
-          <a:p>
-            <a:pPr lvl="1"/>
-            <a:r>
-              <a:rPr lang="en-US" dirty="0" smtClean="0"/>
-              <a:t>Scrum</a:t>
-            </a:r>
-            <a:endParaRPr lang="en-US" dirty="0" smtClean="0"/>
-          </a:p>
-          <a:p>
-            <a:r>
-              <a:rPr lang="en-US" dirty="0" smtClean="0"/>
-              <a:t>4 sprints</a:t>
-            </a:r>
-          </a:p>
-          <a:p>
-            <a:pPr lvl="1"/>
-            <a:r>
-              <a:rPr lang="en-US" dirty="0" smtClean="0"/>
-              <a:t>Incremental releases</a:t>
-            </a:r>
-          </a:p>
-          <a:p>
-            <a:pPr lvl="1"/>
-            <a:r>
-              <a:rPr lang="en-US" dirty="0" smtClean="0"/>
-              <a:t>Continues feedback</a:t>
-            </a:r>
-            <a:endParaRPr lang="en-US" dirty="0" smtClean="0"/>
-          </a:p>
-          <a:p>
-            <a:pPr lvl="1"/>
-            <a:endParaRPr lang="en-US" dirty="0" smtClean="0"/>
+              <a:rPr lang="en-GB" dirty="0" smtClean="0"/>
+              <a:t>A command line tool written in python</a:t>
+            </a:r>
+          </a:p>
+          <a:p>
+            <a:r>
+              <a:rPr lang="en-GB" dirty="0" smtClean="0"/>
+              <a:t>Takes header files, configuration files and some C macroes as input</a:t>
+            </a:r>
+          </a:p>
+          <a:p>
+            <a:r>
+              <a:rPr lang="en-GB" dirty="0" smtClean="0"/>
+              <a:t>Outputs </a:t>
+            </a:r>
+            <a:r>
+              <a:rPr lang="en-GB" dirty="0" err="1" smtClean="0"/>
+              <a:t>Lua</a:t>
+            </a:r>
+            <a:r>
+              <a:rPr lang="en-GB" dirty="0" smtClean="0"/>
+              <a:t> dissectors</a:t>
+            </a:r>
+            <a:endParaRPr lang="en-GB" dirty="0" smtClean="0"/>
+          </a:p>
+          <a:p>
+            <a:r>
+              <a:rPr lang="en-GB" dirty="0" smtClean="0"/>
+              <a:t>Output </a:t>
+            </a:r>
+            <a:r>
+              <a:rPr lang="en-GB" dirty="0" smtClean="0"/>
+              <a:t>semantics </a:t>
+            </a:r>
+            <a:r>
+              <a:rPr lang="en-GB" smtClean="0"/>
+              <a:t>are </a:t>
+            </a:r>
+            <a:r>
+              <a:rPr lang="en-GB" smtClean="0"/>
+              <a:t>highly</a:t>
+            </a:r>
+            <a:r>
+              <a:rPr lang="en-GB" smtClean="0"/>
+              <a:t> </a:t>
+            </a:r>
+            <a:r>
+              <a:rPr lang="en-GB" dirty="0" smtClean="0"/>
+              <a:t>configurable</a:t>
+            </a:r>
           </a:p>
         </p:txBody>
       </p:sp>
     </p:spTree>
     <p:extLst>
       <p:ext uri="{BB962C8B-B14F-4D97-AF65-F5344CB8AC3E}">
-        <p14:creationId xmlns:p14="http://schemas.microsoft.com/office/powerpoint/2010/main" val="1362037293"/>
+        <p14:creationId xmlns:p14="http://schemas.microsoft.com/office/powerpoint/2010/main" val="1075118078"/>
       </p:ext>
     </p:extLst>
   </p:cSld>
   <p:clrMapOvr>
     <a:masterClrMapping/>
   </p:clrMapOvr>
-  <p:transition spd="slow">
+  <p:transition xmlns:p14="http://schemas.microsoft.com/office/powerpoint/2010/main" spd="slow">
     <p:push dir="u"/>
   </p:transition>
   <p:timing>
     <p:tnLst>
       <p:par>
-        <p:cTn id="1" dur="indefinite" restart="never" nodeType="tmRoot"/>
+        <p:cTn xmlns:p14="http://schemas.microsoft.com/office/powerpoint/2010/main" id="1" dur="indefinite" restart="never" nodeType="tmRoot"/>
       </p:par>
     </p:tnLst>
   </p:timing>

</xml_diff>